<commit_message>
Modify stars player spec
</commit_message>
<xml_diff>
--- a/tasks/design/stars/assets/StarsPlayerHeightWidth.pptx
+++ b/tasks/design/stars/assets/StarsPlayerHeightWidth.pptx
@@ -5,10 +5,10 @@
     <p:sldMasterId id="2147483660" r:id="rId1"/>
   </p:sldMasterIdLst>
   <p:sldIdLst>
-    <p:sldId id="256" r:id="rId2"/>
-    <p:sldId id="257" r:id="rId3"/>
-    <p:sldId id="264" r:id="rId4"/>
-    <p:sldId id="261" r:id="rId5"/>
+    <p:sldId id="261" r:id="rId2"/>
+    <p:sldId id="256" r:id="rId3"/>
+    <p:sldId id="257" r:id="rId4"/>
+    <p:sldId id="264" r:id="rId5"/>
     <p:sldId id="262" r:id="rId6"/>
     <p:sldId id="263" r:id="rId7"/>
     <p:sldId id="258" r:id="rId8"/>
@@ -251,7 +251,7 @@
           <a:p>
             <a:fld id="{C686F67E-D72F-46FA-868E-4763D1DBD089}" type="datetimeFigureOut">
               <a:rPr lang="de-DE" smtClean="0"/>
-              <a:t>17.11.2025</a:t>
+              <a:t>10.12.2025</a:t>
             </a:fld>
             <a:endParaRPr lang="de-DE"/>
           </a:p>
@@ -421,7 +421,7 @@
           <a:p>
             <a:fld id="{C686F67E-D72F-46FA-868E-4763D1DBD089}" type="datetimeFigureOut">
               <a:rPr lang="de-DE" smtClean="0"/>
-              <a:t>17.11.2025</a:t>
+              <a:t>10.12.2025</a:t>
             </a:fld>
             <a:endParaRPr lang="de-DE"/>
           </a:p>
@@ -601,7 +601,7 @@
           <a:p>
             <a:fld id="{C686F67E-D72F-46FA-868E-4763D1DBD089}" type="datetimeFigureOut">
               <a:rPr lang="de-DE" smtClean="0"/>
-              <a:t>17.11.2025</a:t>
+              <a:t>10.12.2025</a:t>
             </a:fld>
             <a:endParaRPr lang="de-DE"/>
           </a:p>
@@ -771,7 +771,7 @@
           <a:p>
             <a:fld id="{C686F67E-D72F-46FA-868E-4763D1DBD089}" type="datetimeFigureOut">
               <a:rPr lang="de-DE" smtClean="0"/>
-              <a:t>17.11.2025</a:t>
+              <a:t>10.12.2025</a:t>
             </a:fld>
             <a:endParaRPr lang="de-DE"/>
           </a:p>
@@ -1017,7 +1017,7 @@
           <a:p>
             <a:fld id="{C686F67E-D72F-46FA-868E-4763D1DBD089}" type="datetimeFigureOut">
               <a:rPr lang="de-DE" smtClean="0"/>
-              <a:t>17.11.2025</a:t>
+              <a:t>10.12.2025</a:t>
             </a:fld>
             <a:endParaRPr lang="de-DE"/>
           </a:p>
@@ -1249,7 +1249,7 @@
           <a:p>
             <a:fld id="{C686F67E-D72F-46FA-868E-4763D1DBD089}" type="datetimeFigureOut">
               <a:rPr lang="de-DE" smtClean="0"/>
-              <a:t>17.11.2025</a:t>
+              <a:t>10.12.2025</a:t>
             </a:fld>
             <a:endParaRPr lang="de-DE"/>
           </a:p>
@@ -1616,7 +1616,7 @@
           <a:p>
             <a:fld id="{C686F67E-D72F-46FA-868E-4763D1DBD089}" type="datetimeFigureOut">
               <a:rPr lang="de-DE" smtClean="0"/>
-              <a:t>17.11.2025</a:t>
+              <a:t>10.12.2025</a:t>
             </a:fld>
             <a:endParaRPr lang="de-DE"/>
           </a:p>
@@ -1734,7 +1734,7 @@
           <a:p>
             <a:fld id="{C686F67E-D72F-46FA-868E-4763D1DBD089}" type="datetimeFigureOut">
               <a:rPr lang="de-DE" smtClean="0"/>
-              <a:t>17.11.2025</a:t>
+              <a:t>10.12.2025</a:t>
             </a:fld>
             <a:endParaRPr lang="de-DE"/>
           </a:p>
@@ -1829,7 +1829,7 @@
           <a:p>
             <a:fld id="{C686F67E-D72F-46FA-868E-4763D1DBD089}" type="datetimeFigureOut">
               <a:rPr lang="de-DE" smtClean="0"/>
-              <a:t>17.11.2025</a:t>
+              <a:t>10.12.2025</a:t>
             </a:fld>
             <a:endParaRPr lang="de-DE"/>
           </a:p>
@@ -2106,7 +2106,7 @@
           <a:p>
             <a:fld id="{C686F67E-D72F-46FA-868E-4763D1DBD089}" type="datetimeFigureOut">
               <a:rPr lang="de-DE" smtClean="0"/>
-              <a:t>17.11.2025</a:t>
+              <a:t>10.12.2025</a:t>
             </a:fld>
             <a:endParaRPr lang="de-DE"/>
           </a:p>
@@ -2363,7 +2363,7 @@
           <a:p>
             <a:fld id="{C686F67E-D72F-46FA-868E-4763D1DBD089}" type="datetimeFigureOut">
               <a:rPr lang="de-DE" smtClean="0"/>
-              <a:t>17.11.2025</a:t>
+              <a:t>10.12.2025</a:t>
             </a:fld>
             <a:endParaRPr lang="de-DE"/>
           </a:p>
@@ -2576,7 +2576,7 @@
           <a:p>
             <a:fld id="{C686F67E-D72F-46FA-868E-4763D1DBD089}" type="datetimeFigureOut">
               <a:rPr lang="de-DE" smtClean="0"/>
-              <a:t>17.11.2025</a:t>
+              <a:t>10.12.2025</a:t>
             </a:fld>
             <a:endParaRPr lang="de-DE"/>
           </a:p>
@@ -3268,98 +3268,6 @@
       </p:pic>
       <p:cxnSp>
         <p:nvCxnSpPr>
-          <p:cNvPr id="27" name="Gerader Verbinder 26">
-            <a:extLst>
-              <a:ext uri="{FF2B5EF4-FFF2-40B4-BE49-F238E27FC236}">
-                <a16:creationId xmlns:a16="http://schemas.microsoft.com/office/drawing/2014/main" id="{B35CA3E9-32BA-69CF-CEF6-DD4FA383AAFC}"/>
-              </a:ext>
-            </a:extLst>
-          </p:cNvPr>
-          <p:cNvCxnSpPr>
-            <a:cxnSpLocks/>
-          </p:cNvCxnSpPr>
-          <p:nvPr/>
-        </p:nvCxnSpPr>
-        <p:spPr>
-          <a:xfrm>
-            <a:off x="1230377" y="1400707"/>
-            <a:ext cx="9465648" cy="2562"/>
-          </a:xfrm>
-          <a:prstGeom prst="line">
-            <a:avLst/>
-          </a:prstGeom>
-          <a:ln>
-            <a:solidFill>
-              <a:schemeClr val="accent5">
-                <a:lumMod val="60000"/>
-                <a:lumOff val="40000"/>
-              </a:schemeClr>
-            </a:solidFill>
-          </a:ln>
-        </p:spPr>
-        <p:style>
-          <a:lnRef idx="2">
-            <a:schemeClr val="accent1"/>
-          </a:lnRef>
-          <a:fillRef idx="0">
-            <a:schemeClr val="accent1"/>
-          </a:fillRef>
-          <a:effectRef idx="1">
-            <a:schemeClr val="accent1"/>
-          </a:effectRef>
-          <a:fontRef idx="minor">
-            <a:schemeClr val="tx1"/>
-          </a:fontRef>
-        </p:style>
-      </p:cxnSp>
-      <p:cxnSp>
-        <p:nvCxnSpPr>
-          <p:cNvPr id="30" name="Gerader Verbinder 29">
-            <a:extLst>
-              <a:ext uri="{FF2B5EF4-FFF2-40B4-BE49-F238E27FC236}">
-                <a16:creationId xmlns:a16="http://schemas.microsoft.com/office/drawing/2014/main" id="{1F802901-5BFB-9E83-A4DE-99634BA59294}"/>
-              </a:ext>
-            </a:extLst>
-          </p:cNvPr>
-          <p:cNvCxnSpPr>
-            <a:cxnSpLocks/>
-          </p:cNvCxnSpPr>
-          <p:nvPr/>
-        </p:nvCxnSpPr>
-        <p:spPr>
-          <a:xfrm>
-            <a:off x="1230377" y="7687768"/>
-            <a:ext cx="9465648" cy="2562"/>
-          </a:xfrm>
-          <a:prstGeom prst="line">
-            <a:avLst/>
-          </a:prstGeom>
-          <a:ln>
-            <a:solidFill>
-              <a:schemeClr val="accent5">
-                <a:lumMod val="60000"/>
-                <a:lumOff val="40000"/>
-              </a:schemeClr>
-            </a:solidFill>
-          </a:ln>
-        </p:spPr>
-        <p:style>
-          <a:lnRef idx="2">
-            <a:schemeClr val="accent1"/>
-          </a:lnRef>
-          <a:fillRef idx="0">
-            <a:schemeClr val="accent1"/>
-          </a:fillRef>
-          <a:effectRef idx="1">
-            <a:schemeClr val="accent1"/>
-          </a:effectRef>
-          <a:fontRef idx="minor">
-            <a:schemeClr val="tx1"/>
-          </a:fontRef>
-        </p:style>
-      </p:cxnSp>
-      <p:cxnSp>
-        <p:nvCxnSpPr>
           <p:cNvPr id="31" name="Gerader Verbinder 30">
             <a:extLst>
               <a:ext uri="{FF2B5EF4-FFF2-40B4-BE49-F238E27FC236}">
@@ -3420,8 +3328,8 @@
         </p:nvCxnSpPr>
         <p:spPr>
           <a:xfrm>
-            <a:off x="1589734" y="2273406"/>
-            <a:ext cx="9106290" cy="0"/>
+            <a:off x="1923010" y="2273406"/>
+            <a:ext cx="8773014" cy="0"/>
           </a:xfrm>
           <a:prstGeom prst="line">
             <a:avLst/>
@@ -3433,150 +3341,6 @@
                 <a:lumOff val="40000"/>
               </a:schemeClr>
             </a:solidFill>
-          </a:ln>
-        </p:spPr>
-        <p:style>
-          <a:lnRef idx="2">
-            <a:schemeClr val="accent1"/>
-          </a:lnRef>
-          <a:fillRef idx="0">
-            <a:schemeClr val="accent1"/>
-          </a:fillRef>
-          <a:effectRef idx="1">
-            <a:schemeClr val="accent1"/>
-          </a:effectRef>
-          <a:fontRef idx="minor">
-            <a:schemeClr val="tx1"/>
-          </a:fontRef>
-        </p:style>
-      </p:cxnSp>
-      <p:cxnSp>
-        <p:nvCxnSpPr>
-          <p:cNvPr id="37" name="Gerader Verbinder 36">
-            <a:extLst>
-              <a:ext uri="{FF2B5EF4-FFF2-40B4-BE49-F238E27FC236}">
-                <a16:creationId xmlns:a16="http://schemas.microsoft.com/office/drawing/2014/main" id="{53CDBDF3-DBEC-9FE1-07D2-DFF04B289722}"/>
-              </a:ext>
-            </a:extLst>
-          </p:cNvPr>
-          <p:cNvCxnSpPr>
-            <a:cxnSpLocks/>
-          </p:cNvCxnSpPr>
-          <p:nvPr/>
-        </p:nvCxnSpPr>
-        <p:spPr>
-          <a:xfrm>
-            <a:off x="1335210" y="1410756"/>
-            <a:ext cx="0" cy="6266965"/>
-          </a:xfrm>
-          <a:prstGeom prst="line">
-            <a:avLst/>
-          </a:prstGeom>
-          <a:ln>
-            <a:solidFill>
-              <a:schemeClr val="accent5">
-                <a:lumMod val="60000"/>
-                <a:lumOff val="40000"/>
-              </a:schemeClr>
-            </a:solidFill>
-            <a:headEnd type="arrow"/>
-            <a:tailEnd type="arrow"/>
-          </a:ln>
-        </p:spPr>
-        <p:style>
-          <a:lnRef idx="2">
-            <a:schemeClr val="accent1"/>
-          </a:lnRef>
-          <a:fillRef idx="0">
-            <a:schemeClr val="accent1"/>
-          </a:fillRef>
-          <a:effectRef idx="1">
-            <a:schemeClr val="accent1"/>
-          </a:effectRef>
-          <a:fontRef idx="minor">
-            <a:schemeClr val="tx1"/>
-          </a:fontRef>
-        </p:style>
-      </p:cxnSp>
-      <p:cxnSp>
-        <p:nvCxnSpPr>
-          <p:cNvPr id="41" name="Gerader Verbinder 40">
-            <a:extLst>
-              <a:ext uri="{FF2B5EF4-FFF2-40B4-BE49-F238E27FC236}">
-                <a16:creationId xmlns:a16="http://schemas.microsoft.com/office/drawing/2014/main" id="{0FAEAA5E-23C8-3AC9-F0AB-94C160D81588}"/>
-              </a:ext>
-            </a:extLst>
-          </p:cNvPr>
-          <p:cNvCxnSpPr>
-            <a:cxnSpLocks/>
-          </p:cNvCxnSpPr>
-          <p:nvPr/>
-        </p:nvCxnSpPr>
-        <p:spPr>
-          <a:xfrm>
-            <a:off x="1721709" y="1398147"/>
-            <a:ext cx="0" cy="875261"/>
-          </a:xfrm>
-          <a:prstGeom prst="line">
-            <a:avLst/>
-          </a:prstGeom>
-          <a:ln>
-            <a:solidFill>
-              <a:schemeClr val="accent5">
-                <a:lumMod val="60000"/>
-                <a:lumOff val="40000"/>
-              </a:schemeClr>
-            </a:solidFill>
-            <a:headEnd type="arrow"/>
-            <a:tailEnd type="arrow"/>
-          </a:ln>
-        </p:spPr>
-        <p:style>
-          <a:lnRef idx="2">
-            <a:schemeClr val="accent1"/>
-          </a:lnRef>
-          <a:fillRef idx="0">
-            <a:schemeClr val="accent1"/>
-          </a:fillRef>
-          <a:effectRef idx="1">
-            <a:schemeClr val="accent1"/>
-          </a:effectRef>
-          <a:fontRef idx="minor">
-            <a:schemeClr val="tx1"/>
-          </a:fontRef>
-        </p:style>
-      </p:cxnSp>
-      <p:cxnSp>
-        <p:nvCxnSpPr>
-          <p:cNvPr id="46" name="Gerader Verbinder 45">
-            <a:extLst>
-              <a:ext uri="{FF2B5EF4-FFF2-40B4-BE49-F238E27FC236}">
-                <a16:creationId xmlns:a16="http://schemas.microsoft.com/office/drawing/2014/main" id="{2E4E8D76-34EA-CB92-C064-2C6EB91CC3DD}"/>
-              </a:ext>
-            </a:extLst>
-          </p:cNvPr>
-          <p:cNvCxnSpPr>
-            <a:cxnSpLocks/>
-          </p:cNvCxnSpPr>
-          <p:nvPr/>
-        </p:nvCxnSpPr>
-        <p:spPr>
-          <a:xfrm>
-            <a:off x="2108208" y="1628525"/>
-            <a:ext cx="0" cy="449565"/>
-          </a:xfrm>
-          <a:prstGeom prst="line">
-            <a:avLst/>
-          </a:prstGeom>
-          <a:ln>
-            <a:solidFill>
-              <a:schemeClr val="accent5">
-                <a:lumMod val="60000"/>
-                <a:lumOff val="40000"/>
-              </a:schemeClr>
-            </a:solidFill>
-            <a:headEnd type="arrow"/>
-            <a:tailEnd type="none"/>
           </a:ln>
         </p:spPr>
         <p:style>
@@ -3656,8 +3420,8 @@
         </p:nvCxnSpPr>
         <p:spPr>
           <a:xfrm>
-            <a:off x="1587848" y="6769206"/>
-            <a:ext cx="9106290" cy="0"/>
+            <a:off x="1944005" y="6769206"/>
+            <a:ext cx="8750133" cy="0"/>
           </a:xfrm>
           <a:prstGeom prst="line">
             <a:avLst/>
@@ -3669,54 +3433,6 @@
                 <a:lumOff val="40000"/>
               </a:schemeClr>
             </a:solidFill>
-          </a:ln>
-        </p:spPr>
-        <p:style>
-          <a:lnRef idx="2">
-            <a:schemeClr val="accent1"/>
-          </a:lnRef>
-          <a:fillRef idx="0">
-            <a:schemeClr val="accent1"/>
-          </a:fillRef>
-          <a:effectRef idx="1">
-            <a:schemeClr val="accent1"/>
-          </a:effectRef>
-          <a:fontRef idx="minor">
-            <a:schemeClr val="tx1"/>
-          </a:fontRef>
-        </p:style>
-      </p:cxnSp>
-      <p:cxnSp>
-        <p:nvCxnSpPr>
-          <p:cNvPr id="50" name="Gerader Verbinder 49">
-            <a:extLst>
-              <a:ext uri="{FF2B5EF4-FFF2-40B4-BE49-F238E27FC236}">
-                <a16:creationId xmlns:a16="http://schemas.microsoft.com/office/drawing/2014/main" id="{C1AB7DB9-8FCA-46D3-6E8D-309380EECE2C}"/>
-              </a:ext>
-            </a:extLst>
-          </p:cNvPr>
-          <p:cNvCxnSpPr>
-            <a:cxnSpLocks/>
-          </p:cNvCxnSpPr>
-          <p:nvPr/>
-        </p:nvCxnSpPr>
-        <p:spPr>
-          <a:xfrm>
-            <a:off x="1721709" y="6779256"/>
-            <a:ext cx="0" cy="875261"/>
-          </a:xfrm>
-          <a:prstGeom prst="line">
-            <a:avLst/>
-          </a:prstGeom>
-          <a:ln>
-            <a:solidFill>
-              <a:schemeClr val="accent5">
-                <a:lumMod val="60000"/>
-                <a:lumOff val="40000"/>
-              </a:schemeClr>
-            </a:solidFill>
-            <a:headEnd type="arrow"/>
-            <a:tailEnd type="arrow"/>
           </a:ln>
         </p:spPr>
         <p:style>
@@ -3745,13 +3461,14 @@
           </p:cNvPr>
           <p:cNvCxnSpPr>
             <a:cxnSpLocks/>
+            <a:stCxn id="63" idx="0"/>
           </p:cNvCxnSpPr>
           <p:nvPr/>
         </p:nvCxnSpPr>
         <p:spPr>
           <a:xfrm>
-            <a:off x="4661694" y="733530"/>
-            <a:ext cx="0" cy="6954247"/>
+            <a:off x="4661694" y="919723"/>
+            <a:ext cx="0" cy="6768054"/>
           </a:xfrm>
           <a:prstGeom prst="line">
             <a:avLst/>
@@ -3826,58 +3543,12 @@
           </a:fontRef>
         </p:style>
       </p:cxnSp>
-      <p:cxnSp>
-        <p:nvCxnSpPr>
-          <p:cNvPr id="56" name="Gerader Verbinder 55">
-            <a:extLst>
-              <a:ext uri="{FF2B5EF4-FFF2-40B4-BE49-F238E27FC236}">
-                <a16:creationId xmlns:a16="http://schemas.microsoft.com/office/drawing/2014/main" id="{854F5CFC-1C2A-EA04-7E73-F106B4A52AB9}"/>
-              </a:ext>
-            </a:extLst>
-          </p:cNvPr>
-          <p:cNvCxnSpPr>
-            <a:cxnSpLocks/>
-          </p:cNvCxnSpPr>
-          <p:nvPr/>
-        </p:nvCxnSpPr>
-        <p:spPr>
-          <a:xfrm>
-            <a:off x="2398554" y="341644"/>
-            <a:ext cx="391" cy="7330893"/>
-          </a:xfrm>
-          <a:prstGeom prst="line">
-            <a:avLst/>
-          </a:prstGeom>
-          <a:ln>
-            <a:solidFill>
-              <a:schemeClr val="accent5">
-                <a:lumMod val="60000"/>
-                <a:lumOff val="40000"/>
-              </a:schemeClr>
-            </a:solidFill>
-          </a:ln>
-        </p:spPr>
-        <p:style>
-          <a:lnRef idx="2">
-            <a:schemeClr val="accent1"/>
-          </a:lnRef>
-          <a:fillRef idx="0">
-            <a:schemeClr val="accent1"/>
-          </a:fillRef>
-          <a:effectRef idx="1">
-            <a:schemeClr val="accent1"/>
-          </a:effectRef>
-          <a:fontRef idx="minor">
-            <a:schemeClr val="tx1"/>
-          </a:fontRef>
-        </p:style>
-      </p:cxnSp>
       <p:sp>
         <p:nvSpPr>
-          <p:cNvPr id="60" name="Ellipse 59">
-            <a:extLst>
-              <a:ext uri="{FF2B5EF4-FFF2-40B4-BE49-F238E27FC236}">
-                <a16:creationId xmlns:a16="http://schemas.microsoft.com/office/drawing/2014/main" id="{CB59093C-9CC7-8BD6-BB6C-81DF9963ACB0}"/>
+          <p:cNvPr id="64" name="Ellipse 63">
+            <a:extLst>
+              <a:ext uri="{FF2B5EF4-FFF2-40B4-BE49-F238E27FC236}">
+                <a16:creationId xmlns:a16="http://schemas.microsoft.com/office/drawing/2014/main" id="{AAC8AD59-F4ED-2853-B03C-14A8173FE001}"/>
               </a:ext>
             </a:extLst>
           </p:cNvPr>
@@ -3886,7 +3557,181 @@
         </p:nvSpPr>
         <p:spPr>
           <a:xfrm>
-            <a:off x="1085833" y="2893345"/>
+            <a:off x="1799461" y="7295926"/>
+            <a:ext cx="289088" cy="289088"/>
+          </a:xfrm>
+          <a:prstGeom prst="ellipse">
+            <a:avLst/>
+          </a:prstGeom>
+          <a:solidFill>
+            <a:schemeClr val="accent5">
+              <a:lumMod val="60000"/>
+              <a:lumOff val="40000"/>
+            </a:schemeClr>
+          </a:solidFill>
+          <a:ln>
+            <a:noFill/>
+          </a:ln>
+        </p:spPr>
+        <p:style>
+          <a:lnRef idx="2">
+            <a:schemeClr val="accent1">
+              <a:shade val="15000"/>
+            </a:schemeClr>
+          </a:lnRef>
+          <a:fillRef idx="1">
+            <a:schemeClr val="accent1"/>
+          </a:fillRef>
+          <a:effectRef idx="0">
+            <a:schemeClr val="accent1"/>
+          </a:effectRef>
+          <a:fontRef idx="minor">
+            <a:schemeClr val="lt1"/>
+          </a:fontRef>
+        </p:style>
+        <p:txBody>
+          <a:bodyPr lIns="0" tIns="0" rIns="0" bIns="0" rtlCol="0" anchor="ctr"/>
+          <a:lstStyle/>
+          <a:p>
+            <a:pPr algn="ctr"/>
+            <a:r>
+              <a:rPr lang="de-DE" sz="1600" b="1"/>
+              <a:t>D</a:t>
+            </a:r>
+          </a:p>
+        </p:txBody>
+      </p:sp>
+      <p:sp>
+        <p:nvSpPr>
+          <p:cNvPr id="65" name="Ellipse 64">
+            <a:extLst>
+              <a:ext uri="{FF2B5EF4-FFF2-40B4-BE49-F238E27FC236}">
+                <a16:creationId xmlns:a16="http://schemas.microsoft.com/office/drawing/2014/main" id="{687FE679-300C-1A62-2BBD-97E9A10EFC55}"/>
+              </a:ext>
+            </a:extLst>
+          </p:cNvPr>
+          <p:cNvSpPr/>
+          <p:nvPr/>
+        </p:nvSpPr>
+        <p:spPr>
+          <a:xfrm>
+            <a:off x="1799461" y="6624661"/>
+            <a:ext cx="289088" cy="289088"/>
+          </a:xfrm>
+          <a:prstGeom prst="ellipse">
+            <a:avLst/>
+          </a:prstGeom>
+          <a:solidFill>
+            <a:schemeClr val="accent5">
+              <a:lumMod val="60000"/>
+              <a:lumOff val="40000"/>
+            </a:schemeClr>
+          </a:solidFill>
+          <a:ln>
+            <a:noFill/>
+          </a:ln>
+        </p:spPr>
+        <p:style>
+          <a:lnRef idx="2">
+            <a:schemeClr val="accent1">
+              <a:shade val="15000"/>
+            </a:schemeClr>
+          </a:lnRef>
+          <a:fillRef idx="1">
+            <a:schemeClr val="accent1"/>
+          </a:fillRef>
+          <a:effectRef idx="0">
+            <a:schemeClr val="accent1"/>
+          </a:effectRef>
+          <a:fontRef idx="minor">
+            <a:schemeClr val="lt1"/>
+          </a:fontRef>
+        </p:style>
+        <p:txBody>
+          <a:bodyPr lIns="0" tIns="0" rIns="0" bIns="0" rtlCol="0" anchor="ctr"/>
+          <a:lstStyle/>
+          <a:p>
+            <a:pPr algn="ctr"/>
+            <a:r>
+              <a:rPr lang="de-DE" sz="1600" b="1"/>
+              <a:t>C</a:t>
+            </a:r>
+          </a:p>
+        </p:txBody>
+      </p:sp>
+      <p:sp>
+        <p:nvSpPr>
+          <p:cNvPr id="66" name="Ellipse 65">
+            <a:extLst>
+              <a:ext uri="{FF2B5EF4-FFF2-40B4-BE49-F238E27FC236}">
+                <a16:creationId xmlns:a16="http://schemas.microsoft.com/office/drawing/2014/main" id="{C0BF050D-D267-8BE1-5156-9027148D6E79}"/>
+              </a:ext>
+            </a:extLst>
+          </p:cNvPr>
+          <p:cNvSpPr/>
+          <p:nvPr/>
+        </p:nvSpPr>
+        <p:spPr>
+          <a:xfrm>
+            <a:off x="1799461" y="2126916"/>
+            <a:ext cx="289088" cy="289088"/>
+          </a:xfrm>
+          <a:prstGeom prst="ellipse">
+            <a:avLst/>
+          </a:prstGeom>
+          <a:solidFill>
+            <a:schemeClr val="accent5">
+              <a:lumMod val="60000"/>
+              <a:lumOff val="40000"/>
+            </a:schemeClr>
+          </a:solidFill>
+          <a:ln>
+            <a:noFill/>
+          </a:ln>
+        </p:spPr>
+        <p:style>
+          <a:lnRef idx="2">
+            <a:schemeClr val="accent1">
+              <a:shade val="15000"/>
+            </a:schemeClr>
+          </a:lnRef>
+          <a:fillRef idx="1">
+            <a:schemeClr val="accent1"/>
+          </a:fillRef>
+          <a:effectRef idx="0">
+            <a:schemeClr val="accent1"/>
+          </a:effectRef>
+          <a:fontRef idx="minor">
+            <a:schemeClr val="lt1"/>
+          </a:fontRef>
+        </p:style>
+        <p:txBody>
+          <a:bodyPr lIns="0" tIns="0" rIns="0" bIns="0" rtlCol="0" anchor="ctr"/>
+          <a:lstStyle/>
+          <a:p>
+            <a:pPr algn="ctr"/>
+            <a:r>
+              <a:rPr lang="de-DE" sz="1600" b="1"/>
+              <a:t>B</a:t>
+            </a:r>
+          </a:p>
+        </p:txBody>
+      </p:sp>
+      <p:sp>
+        <p:nvSpPr>
+          <p:cNvPr id="67" name="Ellipse 66">
+            <a:extLst>
+              <a:ext uri="{FF2B5EF4-FFF2-40B4-BE49-F238E27FC236}">
+                <a16:creationId xmlns:a16="http://schemas.microsoft.com/office/drawing/2014/main" id="{F0897EB6-6EED-A631-EC6E-17D7C04FCB59}"/>
+              </a:ext>
+            </a:extLst>
+          </p:cNvPr>
+          <p:cNvSpPr/>
+          <p:nvPr/>
+        </p:nvSpPr>
+        <p:spPr>
+          <a:xfrm>
+            <a:off x="1799461" y="1484929"/>
             <a:ext cx="289088" cy="289088"/>
           </a:xfrm>
           <a:prstGeom prst="ellipse">
@@ -3932,10 +3777,10 @@
       </p:sp>
       <p:sp>
         <p:nvSpPr>
-          <p:cNvPr id="64" name="Ellipse 63">
-            <a:extLst>
-              <a:ext uri="{FF2B5EF4-FFF2-40B4-BE49-F238E27FC236}">
-                <a16:creationId xmlns:a16="http://schemas.microsoft.com/office/drawing/2014/main" id="{AAC8AD59-F4ED-2853-B03C-14A8173FE001}"/>
+          <p:cNvPr id="63" name="Ellipse 62">
+            <a:extLst>
+              <a:ext uri="{FF2B5EF4-FFF2-40B4-BE49-F238E27FC236}">
+                <a16:creationId xmlns:a16="http://schemas.microsoft.com/office/drawing/2014/main" id="{6E37A08A-AEA7-6171-68D3-9BE4999E5636}"/>
               </a:ext>
             </a:extLst>
           </p:cNvPr>
@@ -3944,7 +3789,65 @@
         </p:nvSpPr>
         <p:spPr>
           <a:xfrm>
-            <a:off x="1923010" y="6991189"/>
+            <a:off x="4517150" y="919723"/>
+            <a:ext cx="289088" cy="289088"/>
+          </a:xfrm>
+          <a:prstGeom prst="ellipse">
+            <a:avLst/>
+          </a:prstGeom>
+          <a:solidFill>
+            <a:schemeClr val="accent5">
+              <a:lumMod val="60000"/>
+              <a:lumOff val="40000"/>
+            </a:schemeClr>
+          </a:solidFill>
+          <a:ln>
+            <a:noFill/>
+          </a:ln>
+        </p:spPr>
+        <p:style>
+          <a:lnRef idx="2">
+            <a:schemeClr val="accent1">
+              <a:shade val="15000"/>
+            </a:schemeClr>
+          </a:lnRef>
+          <a:fillRef idx="1">
+            <a:schemeClr val="accent1"/>
+          </a:fillRef>
+          <a:effectRef idx="0">
+            <a:schemeClr val="accent1"/>
+          </a:effectRef>
+          <a:fontRef idx="minor">
+            <a:schemeClr val="lt1"/>
+          </a:fontRef>
+        </p:style>
+        <p:txBody>
+          <a:bodyPr lIns="0" tIns="0" rIns="0" bIns="0" rtlCol="0" anchor="ctr"/>
+          <a:lstStyle/>
+          <a:p>
+            <a:pPr algn="ctr"/>
+            <a:r>
+              <a:rPr lang="de-DE" sz="1600" b="1"/>
+              <a:t>F</a:t>
+            </a:r>
+          </a:p>
+        </p:txBody>
+      </p:sp>
+      <p:sp>
+        <p:nvSpPr>
+          <p:cNvPr id="79" name="Ellipse 78">
+            <a:extLst>
+              <a:ext uri="{FF2B5EF4-FFF2-40B4-BE49-F238E27FC236}">
+                <a16:creationId xmlns:a16="http://schemas.microsoft.com/office/drawing/2014/main" id="{88D5093B-EAD2-1217-6718-66C4978514FE}"/>
+              </a:ext>
+            </a:extLst>
+          </p:cNvPr>
+          <p:cNvSpPr/>
+          <p:nvPr/>
+        </p:nvSpPr>
+        <p:spPr>
+          <a:xfrm>
+            <a:off x="9508906" y="930103"/>
             <a:ext cx="289088" cy="289088"/>
           </a:xfrm>
           <a:prstGeom prst="ellipse">
@@ -3988,12 +3891,107 @@
           </a:p>
         </p:txBody>
       </p:sp>
+      <p:cxnSp>
+        <p:nvCxnSpPr>
+          <p:cNvPr id="14" name="Gerader Verbinder 13">
+            <a:extLst>
+              <a:ext uri="{FF2B5EF4-FFF2-40B4-BE49-F238E27FC236}">
+                <a16:creationId xmlns:a16="http://schemas.microsoft.com/office/drawing/2014/main" id="{D462B3E8-B875-AD36-DC6D-DEB64DD6FF2C}"/>
+              </a:ext>
+            </a:extLst>
+          </p:cNvPr>
+          <p:cNvCxnSpPr>
+            <a:cxnSpLocks/>
+          </p:cNvCxnSpPr>
+          <p:nvPr/>
+        </p:nvCxnSpPr>
+        <p:spPr>
+          <a:xfrm>
+            <a:off x="3444105" y="1086009"/>
+            <a:ext cx="0" cy="6601768"/>
+          </a:xfrm>
+          <a:prstGeom prst="line">
+            <a:avLst/>
+          </a:prstGeom>
+          <a:ln>
+            <a:solidFill>
+              <a:schemeClr val="accent5">
+                <a:lumMod val="60000"/>
+                <a:lumOff val="40000"/>
+              </a:schemeClr>
+            </a:solidFill>
+            <a:prstDash val="dash"/>
+          </a:ln>
+        </p:spPr>
+        <p:style>
+          <a:lnRef idx="2">
+            <a:schemeClr val="accent1"/>
+          </a:lnRef>
+          <a:fillRef idx="0">
+            <a:schemeClr val="accent1"/>
+          </a:fillRef>
+          <a:effectRef idx="1">
+            <a:schemeClr val="accent1"/>
+          </a:effectRef>
+          <a:fontRef idx="minor">
+            <a:schemeClr val="tx1"/>
+          </a:fontRef>
+        </p:style>
+      </p:cxnSp>
+      <p:cxnSp>
+        <p:nvCxnSpPr>
+          <p:cNvPr id="16" name="Gerader Verbinder 15">
+            <a:extLst>
+              <a:ext uri="{FF2B5EF4-FFF2-40B4-BE49-F238E27FC236}">
+                <a16:creationId xmlns:a16="http://schemas.microsoft.com/office/drawing/2014/main" id="{87FEAB77-D9FE-36DB-0276-F439DE6F2498}"/>
+              </a:ext>
+            </a:extLst>
+          </p:cNvPr>
+          <p:cNvCxnSpPr>
+            <a:cxnSpLocks/>
+            <a:stCxn id="8" idx="0"/>
+          </p:cNvCxnSpPr>
+          <p:nvPr/>
+        </p:nvCxnSpPr>
+        <p:spPr>
+          <a:xfrm>
+            <a:off x="8446162" y="930103"/>
+            <a:ext cx="0" cy="6757674"/>
+          </a:xfrm>
+          <a:prstGeom prst="line">
+            <a:avLst/>
+          </a:prstGeom>
+          <a:ln>
+            <a:solidFill>
+              <a:schemeClr val="accent5">
+                <a:lumMod val="60000"/>
+                <a:lumOff val="40000"/>
+              </a:schemeClr>
+            </a:solidFill>
+            <a:prstDash val="dash"/>
+          </a:ln>
+        </p:spPr>
+        <p:style>
+          <a:lnRef idx="2">
+            <a:schemeClr val="accent1"/>
+          </a:lnRef>
+          <a:fillRef idx="0">
+            <a:schemeClr val="accent1"/>
+          </a:fillRef>
+          <a:effectRef idx="1">
+            <a:schemeClr val="accent1"/>
+          </a:effectRef>
+          <a:fontRef idx="minor">
+            <a:schemeClr val="tx1"/>
+          </a:fontRef>
+        </p:style>
+      </p:cxnSp>
       <p:sp>
         <p:nvSpPr>
-          <p:cNvPr id="65" name="Ellipse 64">
-            <a:extLst>
-              <a:ext uri="{FF2B5EF4-FFF2-40B4-BE49-F238E27FC236}">
-                <a16:creationId xmlns:a16="http://schemas.microsoft.com/office/drawing/2014/main" id="{687FE679-300C-1A62-2BBD-97E9A10EFC55}"/>
+          <p:cNvPr id="15" name="Rechteck 14">
+            <a:extLst>
+              <a:ext uri="{FF2B5EF4-FFF2-40B4-BE49-F238E27FC236}">
+                <a16:creationId xmlns:a16="http://schemas.microsoft.com/office/drawing/2014/main" id="{88986488-C8C5-6AE9-2221-8CC50033911D}"/>
               </a:ext>
             </a:extLst>
           </p:cNvPr>
@@ -4002,20 +4000,23 @@
         </p:nvSpPr>
         <p:spPr>
           <a:xfrm>
-            <a:off x="1503085" y="6960294"/>
-            <a:ext cx="289088" cy="289088"/>
-          </a:xfrm>
-          <a:prstGeom prst="ellipse">
+            <a:off x="2415608" y="2271460"/>
+            <a:ext cx="8272730" cy="4497745"/>
+          </a:xfrm>
+          <a:prstGeom prst="rect">
             <a:avLst/>
           </a:prstGeom>
           <a:solidFill>
-            <a:schemeClr val="accent5">
-              <a:lumMod val="60000"/>
-              <a:lumOff val="40000"/>
+            <a:schemeClr val="accent1">
+              <a:alpha val="27000"/>
             </a:schemeClr>
           </a:solidFill>
           <a:ln>
-            <a:noFill/>
+            <a:solidFill>
+              <a:schemeClr val="accent1">
+                <a:shade val="15000"/>
+              </a:schemeClr>
+            </a:solidFill>
           </a:ln>
         </p:spPr>
         <p:style>
@@ -4035,23 +4036,20 @@
           </a:fontRef>
         </p:style>
         <p:txBody>
-          <a:bodyPr lIns="0" tIns="0" rIns="0" bIns="0" rtlCol="0" anchor="ctr"/>
+          <a:bodyPr rtlCol="0" anchor="ctr"/>
           <a:lstStyle/>
           <a:p>
             <a:pPr algn="ctr"/>
-            <a:r>
-              <a:rPr lang="de-DE" sz="1600" b="1"/>
-              <a:t>D</a:t>
-            </a:r>
+            <a:endParaRPr lang="de-DE"/>
           </a:p>
         </p:txBody>
       </p:sp>
       <p:sp>
         <p:nvSpPr>
-          <p:cNvPr id="66" name="Ellipse 65">
-            <a:extLst>
-              <a:ext uri="{FF2B5EF4-FFF2-40B4-BE49-F238E27FC236}">
-                <a16:creationId xmlns:a16="http://schemas.microsoft.com/office/drawing/2014/main" id="{C0BF050D-D267-8BE1-5156-9027148D6E79}"/>
+          <p:cNvPr id="8" name="Ellipse 7">
+            <a:extLst>
+              <a:ext uri="{FF2B5EF4-FFF2-40B4-BE49-F238E27FC236}">
+                <a16:creationId xmlns:a16="http://schemas.microsoft.com/office/drawing/2014/main" id="{F308149B-C2F9-3F82-C6AE-D30E77674AC8}"/>
               </a:ext>
             </a:extLst>
           </p:cNvPr>
@@ -4060,429 +4058,7 @@
         </p:nvSpPr>
         <p:spPr>
           <a:xfrm>
-            <a:off x="1477393" y="1595830"/>
-            <a:ext cx="289088" cy="289088"/>
-          </a:xfrm>
-          <a:prstGeom prst="ellipse">
-            <a:avLst/>
-          </a:prstGeom>
-          <a:solidFill>
-            <a:schemeClr val="accent5">
-              <a:lumMod val="60000"/>
-              <a:lumOff val="40000"/>
-            </a:schemeClr>
-          </a:solidFill>
-          <a:ln>
-            <a:noFill/>
-          </a:ln>
-        </p:spPr>
-        <p:style>
-          <a:lnRef idx="2">
-            <a:schemeClr val="accent1">
-              <a:shade val="15000"/>
-            </a:schemeClr>
-          </a:lnRef>
-          <a:fillRef idx="1">
-            <a:schemeClr val="accent1"/>
-          </a:fillRef>
-          <a:effectRef idx="0">
-            <a:schemeClr val="accent1"/>
-          </a:effectRef>
-          <a:fontRef idx="minor">
-            <a:schemeClr val="lt1"/>
-          </a:fontRef>
-        </p:style>
-        <p:txBody>
-          <a:bodyPr lIns="0" tIns="0" rIns="0" bIns="0" rtlCol="0" anchor="ctr"/>
-          <a:lstStyle/>
-          <a:p>
-            <a:pPr algn="ctr"/>
-            <a:r>
-              <a:rPr lang="de-DE" sz="1600" b="1"/>
-              <a:t>B</a:t>
-            </a:r>
-          </a:p>
-        </p:txBody>
-      </p:sp>
-      <p:sp>
-        <p:nvSpPr>
-          <p:cNvPr id="67" name="Ellipse 66">
-            <a:extLst>
-              <a:ext uri="{FF2B5EF4-FFF2-40B4-BE49-F238E27FC236}">
-                <a16:creationId xmlns:a16="http://schemas.microsoft.com/office/drawing/2014/main" id="{F0897EB6-6EED-A631-EC6E-17D7C04FCB59}"/>
-              </a:ext>
-            </a:extLst>
-          </p:cNvPr>
-          <p:cNvSpPr/>
-          <p:nvPr/>
-        </p:nvSpPr>
-        <p:spPr>
-          <a:xfrm>
-            <a:off x="1847111" y="1789002"/>
-            <a:ext cx="289088" cy="289088"/>
-          </a:xfrm>
-          <a:prstGeom prst="ellipse">
-            <a:avLst/>
-          </a:prstGeom>
-          <a:solidFill>
-            <a:schemeClr val="accent5">
-              <a:lumMod val="60000"/>
-              <a:lumOff val="40000"/>
-            </a:schemeClr>
-          </a:solidFill>
-          <a:ln>
-            <a:noFill/>
-          </a:ln>
-        </p:spPr>
-        <p:style>
-          <a:lnRef idx="2">
-            <a:schemeClr val="accent1">
-              <a:shade val="15000"/>
-            </a:schemeClr>
-          </a:lnRef>
-          <a:fillRef idx="1">
-            <a:schemeClr val="accent1"/>
-          </a:fillRef>
-          <a:effectRef idx="0">
-            <a:schemeClr val="accent1"/>
-          </a:effectRef>
-          <a:fontRef idx="minor">
-            <a:schemeClr val="lt1"/>
-          </a:fontRef>
-        </p:style>
-        <p:txBody>
-          <a:bodyPr lIns="0" tIns="0" rIns="0" bIns="0" rtlCol="0" anchor="ctr"/>
-          <a:lstStyle/>
-          <a:p>
-            <a:pPr algn="ctr"/>
-            <a:r>
-              <a:rPr lang="de-DE" sz="1600" b="1"/>
-              <a:t>C</a:t>
-            </a:r>
-          </a:p>
-        </p:txBody>
-      </p:sp>
-      <p:cxnSp>
-        <p:nvCxnSpPr>
-          <p:cNvPr id="69" name="Gerader Verbinder 68">
-            <a:extLst>
-              <a:ext uri="{FF2B5EF4-FFF2-40B4-BE49-F238E27FC236}">
-                <a16:creationId xmlns:a16="http://schemas.microsoft.com/office/drawing/2014/main" id="{AFBAE565-41E1-D3AE-9615-4812EA02F1EC}"/>
-              </a:ext>
-            </a:extLst>
-          </p:cNvPr>
-          <p:cNvCxnSpPr>
-            <a:cxnSpLocks/>
-          </p:cNvCxnSpPr>
-          <p:nvPr/>
-        </p:nvCxnSpPr>
-        <p:spPr>
-          <a:xfrm>
-            <a:off x="10694138" y="341644"/>
-            <a:ext cx="0" cy="7346133"/>
-          </a:xfrm>
-          <a:prstGeom prst="line">
-            <a:avLst/>
-          </a:prstGeom>
-          <a:ln>
-            <a:solidFill>
-              <a:schemeClr val="accent5">
-                <a:lumMod val="60000"/>
-                <a:lumOff val="40000"/>
-              </a:schemeClr>
-            </a:solidFill>
-          </a:ln>
-        </p:spPr>
-        <p:style>
-          <a:lnRef idx="2">
-            <a:schemeClr val="accent1"/>
-          </a:lnRef>
-          <a:fillRef idx="0">
-            <a:schemeClr val="accent1"/>
-          </a:fillRef>
-          <a:effectRef idx="1">
-            <a:schemeClr val="accent1"/>
-          </a:effectRef>
-          <a:fontRef idx="minor">
-            <a:schemeClr val="tx1"/>
-          </a:fontRef>
-        </p:style>
-      </p:cxnSp>
-      <p:cxnSp>
-        <p:nvCxnSpPr>
-          <p:cNvPr id="70" name="Gerader Verbinder 69">
-            <a:extLst>
-              <a:ext uri="{FF2B5EF4-FFF2-40B4-BE49-F238E27FC236}">
-                <a16:creationId xmlns:a16="http://schemas.microsoft.com/office/drawing/2014/main" id="{762EC232-9770-95AA-22C7-BF51888835FD}"/>
-              </a:ext>
-            </a:extLst>
-          </p:cNvPr>
-          <p:cNvCxnSpPr>
-            <a:cxnSpLocks/>
-          </p:cNvCxnSpPr>
-          <p:nvPr/>
-        </p:nvCxnSpPr>
-        <p:spPr>
-          <a:xfrm>
-            <a:off x="2398554" y="452186"/>
-            <a:ext cx="8293694" cy="0"/>
-          </a:xfrm>
-          <a:prstGeom prst="line">
-            <a:avLst/>
-          </a:prstGeom>
-          <a:ln>
-            <a:solidFill>
-              <a:schemeClr val="accent5">
-                <a:lumMod val="60000"/>
-                <a:lumOff val="40000"/>
-              </a:schemeClr>
-            </a:solidFill>
-            <a:headEnd type="arrow"/>
-            <a:tailEnd type="arrow"/>
-          </a:ln>
-        </p:spPr>
-        <p:style>
-          <a:lnRef idx="2">
-            <a:schemeClr val="accent1"/>
-          </a:lnRef>
-          <a:fillRef idx="0">
-            <a:schemeClr val="accent1"/>
-          </a:fillRef>
-          <a:effectRef idx="1">
-            <a:schemeClr val="accent1"/>
-          </a:effectRef>
-          <a:fontRef idx="minor">
-            <a:schemeClr val="tx1"/>
-          </a:fontRef>
-        </p:style>
-      </p:cxnSp>
-      <p:cxnSp>
-        <p:nvCxnSpPr>
-          <p:cNvPr id="73" name="Gerader Verbinder 72">
-            <a:extLst>
-              <a:ext uri="{FF2B5EF4-FFF2-40B4-BE49-F238E27FC236}">
-                <a16:creationId xmlns:a16="http://schemas.microsoft.com/office/drawing/2014/main" id="{9CA38E13-40C2-1296-7680-7F0E5091C049}"/>
-              </a:ext>
-            </a:extLst>
-          </p:cNvPr>
-          <p:cNvCxnSpPr>
-            <a:cxnSpLocks/>
-          </p:cNvCxnSpPr>
-          <p:nvPr/>
-        </p:nvCxnSpPr>
-        <p:spPr>
-          <a:xfrm flipH="1">
-            <a:off x="2415608" y="864168"/>
-            <a:ext cx="2246086" cy="0"/>
-          </a:xfrm>
-          <a:prstGeom prst="line">
-            <a:avLst/>
-          </a:prstGeom>
-          <a:ln>
-            <a:solidFill>
-              <a:schemeClr val="accent5">
-                <a:lumMod val="60000"/>
-                <a:lumOff val="40000"/>
-              </a:schemeClr>
-            </a:solidFill>
-            <a:headEnd type="arrow"/>
-            <a:tailEnd type="arrow"/>
-          </a:ln>
-        </p:spPr>
-        <p:style>
-          <a:lnRef idx="2">
-            <a:schemeClr val="accent1"/>
-          </a:lnRef>
-          <a:fillRef idx="0">
-            <a:schemeClr val="accent1"/>
-          </a:fillRef>
-          <a:effectRef idx="1">
-            <a:schemeClr val="accent1"/>
-          </a:effectRef>
-          <a:fontRef idx="minor">
-            <a:schemeClr val="tx1"/>
-          </a:fontRef>
-        </p:style>
-      </p:cxnSp>
-      <p:cxnSp>
-        <p:nvCxnSpPr>
-          <p:cNvPr id="76" name="Gerader Verbinder 75">
-            <a:extLst>
-              <a:ext uri="{FF2B5EF4-FFF2-40B4-BE49-F238E27FC236}">
-                <a16:creationId xmlns:a16="http://schemas.microsoft.com/office/drawing/2014/main" id="{7B6F2E6A-16FB-F90C-4211-696126CF7F49}"/>
-              </a:ext>
-            </a:extLst>
-          </p:cNvPr>
-          <p:cNvCxnSpPr>
-            <a:cxnSpLocks/>
-          </p:cNvCxnSpPr>
-          <p:nvPr/>
-        </p:nvCxnSpPr>
-        <p:spPr>
-          <a:xfrm flipH="1">
-            <a:off x="9653450" y="1205802"/>
-            <a:ext cx="1038798" cy="0"/>
-          </a:xfrm>
-          <a:prstGeom prst="line">
-            <a:avLst/>
-          </a:prstGeom>
-          <a:ln>
-            <a:solidFill>
-              <a:schemeClr val="accent5">
-                <a:lumMod val="60000"/>
-                <a:lumOff val="40000"/>
-              </a:schemeClr>
-            </a:solidFill>
-            <a:headEnd type="arrow"/>
-            <a:tailEnd type="arrow"/>
-          </a:ln>
-        </p:spPr>
-        <p:style>
-          <a:lnRef idx="2">
-            <a:schemeClr val="accent1"/>
-          </a:lnRef>
-          <a:fillRef idx="0">
-            <a:schemeClr val="accent1"/>
-          </a:fillRef>
-          <a:effectRef idx="1">
-            <a:schemeClr val="accent1"/>
-          </a:effectRef>
-          <a:fontRef idx="minor">
-            <a:schemeClr val="tx1"/>
-          </a:fontRef>
-        </p:style>
-      </p:cxnSp>
-      <p:sp>
-        <p:nvSpPr>
-          <p:cNvPr id="63" name="Ellipse 62">
-            <a:extLst>
-              <a:ext uri="{FF2B5EF4-FFF2-40B4-BE49-F238E27FC236}">
-                <a16:creationId xmlns:a16="http://schemas.microsoft.com/office/drawing/2014/main" id="{6E37A08A-AEA7-6171-68D3-9BE4999E5636}"/>
-              </a:ext>
-            </a:extLst>
-          </p:cNvPr>
-          <p:cNvSpPr/>
-          <p:nvPr/>
-        </p:nvSpPr>
-        <p:spPr>
-          <a:xfrm>
-            <a:off x="2815220" y="643139"/>
-            <a:ext cx="289088" cy="289088"/>
-          </a:xfrm>
-          <a:prstGeom prst="ellipse">
-            <a:avLst/>
-          </a:prstGeom>
-          <a:solidFill>
-            <a:schemeClr val="accent5">
-              <a:lumMod val="60000"/>
-              <a:lumOff val="40000"/>
-            </a:schemeClr>
-          </a:solidFill>
-          <a:ln>
-            <a:noFill/>
-          </a:ln>
-        </p:spPr>
-        <p:style>
-          <a:lnRef idx="2">
-            <a:schemeClr val="accent1">
-              <a:shade val="15000"/>
-            </a:schemeClr>
-          </a:lnRef>
-          <a:fillRef idx="1">
-            <a:schemeClr val="accent1"/>
-          </a:fillRef>
-          <a:effectRef idx="0">
-            <a:schemeClr val="accent1"/>
-          </a:effectRef>
-          <a:fontRef idx="minor">
-            <a:schemeClr val="lt1"/>
-          </a:fontRef>
-        </p:style>
-        <p:txBody>
-          <a:bodyPr lIns="0" tIns="0" rIns="0" bIns="0" rtlCol="0" anchor="ctr"/>
-          <a:lstStyle/>
-          <a:p>
-            <a:pPr algn="ctr"/>
-            <a:r>
-              <a:rPr lang="de-DE" sz="1600" b="1"/>
-              <a:t>G</a:t>
-            </a:r>
-          </a:p>
-        </p:txBody>
-      </p:sp>
-      <p:sp>
-        <p:nvSpPr>
-          <p:cNvPr id="79" name="Ellipse 78">
-            <a:extLst>
-              <a:ext uri="{FF2B5EF4-FFF2-40B4-BE49-F238E27FC236}">
-                <a16:creationId xmlns:a16="http://schemas.microsoft.com/office/drawing/2014/main" id="{88D5093B-EAD2-1217-6718-66C4978514FE}"/>
-              </a:ext>
-            </a:extLst>
-          </p:cNvPr>
-          <p:cNvSpPr/>
-          <p:nvPr/>
-        </p:nvSpPr>
-        <p:spPr>
-          <a:xfrm>
-            <a:off x="9924407" y="954572"/>
-            <a:ext cx="289088" cy="289088"/>
-          </a:xfrm>
-          <a:prstGeom prst="ellipse">
-            <a:avLst/>
-          </a:prstGeom>
-          <a:solidFill>
-            <a:schemeClr val="accent5">
-              <a:lumMod val="60000"/>
-              <a:lumOff val="40000"/>
-            </a:schemeClr>
-          </a:solidFill>
-          <a:ln>
-            <a:noFill/>
-          </a:ln>
-        </p:spPr>
-        <p:style>
-          <a:lnRef idx="2">
-            <a:schemeClr val="accent1">
-              <a:shade val="15000"/>
-            </a:schemeClr>
-          </a:lnRef>
-          <a:fillRef idx="1">
-            <a:schemeClr val="accent1"/>
-          </a:fillRef>
-          <a:effectRef idx="0">
-            <a:schemeClr val="accent1"/>
-          </a:effectRef>
-          <a:fontRef idx="minor">
-            <a:schemeClr val="lt1"/>
-          </a:fontRef>
-        </p:style>
-        <p:txBody>
-          <a:bodyPr lIns="0" tIns="0" rIns="0" bIns="0" rtlCol="0" anchor="ctr"/>
-          <a:lstStyle/>
-          <a:p>
-            <a:pPr algn="ctr"/>
-            <a:r>
-              <a:rPr lang="de-DE" sz="1600" b="1"/>
-              <a:t>H</a:t>
-            </a:r>
-          </a:p>
-        </p:txBody>
-      </p:sp>
-      <p:sp>
-        <p:nvSpPr>
-          <p:cNvPr id="80" name="Ellipse 79">
-            <a:extLst>
-              <a:ext uri="{FF2B5EF4-FFF2-40B4-BE49-F238E27FC236}">
-                <a16:creationId xmlns:a16="http://schemas.microsoft.com/office/drawing/2014/main" id="{1A3D518E-7775-24F2-1883-330B53205155}"/>
-              </a:ext>
-            </a:extLst>
-          </p:cNvPr>
-          <p:cNvSpPr/>
-          <p:nvPr/>
-        </p:nvSpPr>
-        <p:spPr>
-          <a:xfrm>
-            <a:off x="3681053" y="218308"/>
+            <a:off x="8301618" y="930103"/>
             <a:ext cx="289088" cy="289088"/>
           </a:xfrm>
           <a:prstGeom prst="ellipse">
@@ -4526,300 +4102,12 @@
           </a:p>
         </p:txBody>
       </p:sp>
-      <p:cxnSp>
-        <p:nvCxnSpPr>
-          <p:cNvPr id="2" name="Gerader Verbinder 1">
-            <a:extLst>
-              <a:ext uri="{FF2B5EF4-FFF2-40B4-BE49-F238E27FC236}">
-                <a16:creationId xmlns:a16="http://schemas.microsoft.com/office/drawing/2014/main" id="{B7425FDB-DFB0-6E95-1939-F1E1F6E59258}"/>
-              </a:ext>
-            </a:extLst>
-          </p:cNvPr>
-          <p:cNvCxnSpPr>
-            <a:cxnSpLocks/>
-          </p:cNvCxnSpPr>
-          <p:nvPr/>
-        </p:nvCxnSpPr>
-        <p:spPr>
-          <a:xfrm>
-            <a:off x="2108208" y="1146641"/>
-            <a:ext cx="0" cy="249337"/>
-          </a:xfrm>
-          <a:prstGeom prst="line">
-            <a:avLst/>
-          </a:prstGeom>
-          <a:ln>
-            <a:solidFill>
-              <a:schemeClr val="accent5">
-                <a:lumMod val="60000"/>
-                <a:lumOff val="40000"/>
-              </a:schemeClr>
-            </a:solidFill>
-            <a:headEnd type="none"/>
-            <a:tailEnd type="arrow"/>
-          </a:ln>
-        </p:spPr>
-        <p:style>
-          <a:lnRef idx="2">
-            <a:schemeClr val="accent1"/>
-          </a:lnRef>
-          <a:fillRef idx="0">
-            <a:schemeClr val="accent1"/>
-          </a:fillRef>
-          <a:effectRef idx="1">
-            <a:schemeClr val="accent1"/>
-          </a:effectRef>
-          <a:fontRef idx="minor">
-            <a:schemeClr val="tx1"/>
-          </a:fontRef>
-        </p:style>
-      </p:cxnSp>
-      <p:cxnSp>
-        <p:nvCxnSpPr>
-          <p:cNvPr id="3" name="Gerader Verbinder 2">
-            <a:extLst>
-              <a:ext uri="{FF2B5EF4-FFF2-40B4-BE49-F238E27FC236}">
-                <a16:creationId xmlns:a16="http://schemas.microsoft.com/office/drawing/2014/main" id="{4E7ED842-F95E-1E53-5514-5E52B11BA244}"/>
-              </a:ext>
-            </a:extLst>
-          </p:cNvPr>
-          <p:cNvCxnSpPr>
-            <a:cxnSpLocks/>
-          </p:cNvCxnSpPr>
-          <p:nvPr/>
-        </p:nvCxnSpPr>
-        <p:spPr>
-          <a:xfrm>
-            <a:off x="2108208" y="1146641"/>
-            <a:ext cx="0" cy="642320"/>
-          </a:xfrm>
-          <a:prstGeom prst="line">
-            <a:avLst/>
-          </a:prstGeom>
-          <a:ln>
-            <a:solidFill>
-              <a:schemeClr val="accent5">
-                <a:lumMod val="60000"/>
-                <a:lumOff val="40000"/>
-              </a:schemeClr>
-            </a:solidFill>
-            <a:headEnd type="none"/>
-            <a:tailEnd type="none"/>
-          </a:ln>
-        </p:spPr>
-        <p:style>
-          <a:lnRef idx="2">
-            <a:schemeClr val="accent1"/>
-          </a:lnRef>
-          <a:fillRef idx="0">
-            <a:schemeClr val="accent1"/>
-          </a:fillRef>
-          <a:effectRef idx="1">
-            <a:schemeClr val="accent1"/>
-          </a:effectRef>
-          <a:fontRef idx="minor">
-            <a:schemeClr val="tx1"/>
-          </a:fontRef>
-        </p:style>
-      </p:cxnSp>
-      <p:cxnSp>
-        <p:nvCxnSpPr>
-          <p:cNvPr id="9" name="Gerader Verbinder 8">
-            <a:extLst>
-              <a:ext uri="{FF2B5EF4-FFF2-40B4-BE49-F238E27FC236}">
-                <a16:creationId xmlns:a16="http://schemas.microsoft.com/office/drawing/2014/main" id="{03DA25DC-19EA-2FCC-7847-BA3535FC143B}"/>
-              </a:ext>
-            </a:extLst>
-          </p:cNvPr>
-          <p:cNvCxnSpPr>
-            <a:cxnSpLocks/>
-          </p:cNvCxnSpPr>
-          <p:nvPr/>
-        </p:nvCxnSpPr>
-        <p:spPr>
-          <a:xfrm>
-            <a:off x="2158131" y="7687768"/>
-            <a:ext cx="0" cy="449565"/>
-          </a:xfrm>
-          <a:prstGeom prst="line">
-            <a:avLst/>
-          </a:prstGeom>
-          <a:ln>
-            <a:solidFill>
-              <a:schemeClr val="accent5">
-                <a:lumMod val="60000"/>
-                <a:lumOff val="40000"/>
-              </a:schemeClr>
-            </a:solidFill>
-            <a:headEnd type="arrow"/>
-            <a:tailEnd type="none"/>
-          </a:ln>
-        </p:spPr>
-        <p:style>
-          <a:lnRef idx="2">
-            <a:schemeClr val="accent1"/>
-          </a:lnRef>
-          <a:fillRef idx="0">
-            <a:schemeClr val="accent1"/>
-          </a:fillRef>
-          <a:effectRef idx="1">
-            <a:schemeClr val="accent1"/>
-          </a:effectRef>
-          <a:fontRef idx="minor">
-            <a:schemeClr val="tx1"/>
-          </a:fontRef>
-        </p:style>
-      </p:cxnSp>
-      <p:cxnSp>
-        <p:nvCxnSpPr>
-          <p:cNvPr id="10" name="Gerader Verbinder 9">
-            <a:extLst>
-              <a:ext uri="{FF2B5EF4-FFF2-40B4-BE49-F238E27FC236}">
-                <a16:creationId xmlns:a16="http://schemas.microsoft.com/office/drawing/2014/main" id="{B86BF6AE-3A72-388C-279F-DFE8EC16E4E6}"/>
-              </a:ext>
-            </a:extLst>
-          </p:cNvPr>
-          <p:cNvCxnSpPr>
-            <a:cxnSpLocks/>
-          </p:cNvCxnSpPr>
-          <p:nvPr/>
-        </p:nvCxnSpPr>
-        <p:spPr>
-          <a:xfrm>
-            <a:off x="2158131" y="7205884"/>
-            <a:ext cx="0" cy="249337"/>
-          </a:xfrm>
-          <a:prstGeom prst="line">
-            <a:avLst/>
-          </a:prstGeom>
-          <a:ln>
-            <a:solidFill>
-              <a:schemeClr val="accent5">
-                <a:lumMod val="60000"/>
-                <a:lumOff val="40000"/>
-              </a:schemeClr>
-            </a:solidFill>
-            <a:headEnd type="none"/>
-            <a:tailEnd type="arrow"/>
-          </a:ln>
-        </p:spPr>
-        <p:style>
-          <a:lnRef idx="2">
-            <a:schemeClr val="accent1"/>
-          </a:lnRef>
-          <a:fillRef idx="0">
-            <a:schemeClr val="accent1"/>
-          </a:fillRef>
-          <a:effectRef idx="1">
-            <a:schemeClr val="accent1"/>
-          </a:effectRef>
-          <a:fontRef idx="minor">
-            <a:schemeClr val="tx1"/>
-          </a:fontRef>
-        </p:style>
-      </p:cxnSp>
-      <p:cxnSp>
-        <p:nvCxnSpPr>
-          <p:cNvPr id="11" name="Gerader Verbinder 10">
-            <a:extLst>
-              <a:ext uri="{FF2B5EF4-FFF2-40B4-BE49-F238E27FC236}">
-                <a16:creationId xmlns:a16="http://schemas.microsoft.com/office/drawing/2014/main" id="{30387AB0-0B2E-AB32-B378-E3AEC9AA5647}"/>
-              </a:ext>
-            </a:extLst>
-          </p:cNvPr>
-          <p:cNvCxnSpPr>
-            <a:cxnSpLocks/>
-          </p:cNvCxnSpPr>
-          <p:nvPr/>
-        </p:nvCxnSpPr>
-        <p:spPr>
-          <a:xfrm>
-            <a:off x="2158131" y="6924514"/>
-            <a:ext cx="0" cy="790340"/>
-          </a:xfrm>
-          <a:prstGeom prst="line">
-            <a:avLst/>
-          </a:prstGeom>
-          <a:ln>
-            <a:solidFill>
-              <a:schemeClr val="accent5">
-                <a:lumMod val="60000"/>
-                <a:lumOff val="40000"/>
-              </a:schemeClr>
-            </a:solidFill>
-            <a:headEnd type="none"/>
-            <a:tailEnd type="none"/>
-          </a:ln>
-        </p:spPr>
-        <p:style>
-          <a:lnRef idx="2">
-            <a:schemeClr val="accent1"/>
-          </a:lnRef>
-          <a:fillRef idx="0">
-            <a:schemeClr val="accent1"/>
-          </a:fillRef>
-          <a:effectRef idx="1">
-            <a:schemeClr val="accent1"/>
-          </a:effectRef>
-          <a:fontRef idx="minor">
-            <a:schemeClr val="tx1"/>
-          </a:fontRef>
-        </p:style>
-      </p:cxnSp>
-      <p:cxnSp>
-        <p:nvCxnSpPr>
-          <p:cNvPr id="6" name="Gerader Verbinder 5">
-            <a:extLst>
-              <a:ext uri="{FF2B5EF4-FFF2-40B4-BE49-F238E27FC236}">
-                <a16:creationId xmlns:a16="http://schemas.microsoft.com/office/drawing/2014/main" id="{BF026375-CAB4-2B31-50E0-E04363E6390F}"/>
-              </a:ext>
-            </a:extLst>
-          </p:cNvPr>
-          <p:cNvCxnSpPr>
-            <a:cxnSpLocks/>
-          </p:cNvCxnSpPr>
-          <p:nvPr/>
-        </p:nvCxnSpPr>
-        <p:spPr>
-          <a:xfrm flipH="1">
-            <a:off x="8446162" y="865654"/>
-            <a:ext cx="2246086" cy="0"/>
-          </a:xfrm>
-          <a:prstGeom prst="line">
-            <a:avLst/>
-          </a:prstGeom>
-          <a:ln>
-            <a:solidFill>
-              <a:schemeClr val="accent5">
-                <a:lumMod val="60000"/>
-                <a:lumOff val="40000"/>
-              </a:schemeClr>
-            </a:solidFill>
-            <a:headEnd type="arrow"/>
-            <a:tailEnd type="arrow"/>
-          </a:ln>
-        </p:spPr>
-        <p:style>
-          <a:lnRef idx="2">
-            <a:schemeClr val="accent1"/>
-          </a:lnRef>
-          <a:fillRef idx="0">
-            <a:schemeClr val="accent1"/>
-          </a:fillRef>
-          <a:effectRef idx="1">
-            <a:schemeClr val="accent1"/>
-          </a:effectRef>
-          <a:fontRef idx="minor">
-            <a:schemeClr val="tx1"/>
-          </a:fontRef>
-        </p:style>
-      </p:cxnSp>
       <p:sp>
         <p:nvSpPr>
-          <p:cNvPr id="8" name="Ellipse 7">
-            <a:extLst>
-              <a:ext uri="{FF2B5EF4-FFF2-40B4-BE49-F238E27FC236}">
-                <a16:creationId xmlns:a16="http://schemas.microsoft.com/office/drawing/2014/main" id="{F308149B-C2F9-3F82-C6AE-D30E77674AC8}"/>
+          <p:cNvPr id="13" name="Ellipse 12">
+            <a:extLst>
+              <a:ext uri="{FF2B5EF4-FFF2-40B4-BE49-F238E27FC236}">
+                <a16:creationId xmlns:a16="http://schemas.microsoft.com/office/drawing/2014/main" id="{C012AF5E-9F8F-56AE-C1F8-409A4FC6D6CA}"/>
               </a:ext>
             </a:extLst>
           </p:cNvPr>
@@ -4828,7 +4116,7 @@
         </p:nvSpPr>
         <p:spPr>
           <a:xfrm>
-            <a:off x="8845774" y="644625"/>
+            <a:off x="3295863" y="924516"/>
             <a:ext cx="289088" cy="289088"/>
           </a:xfrm>
           <a:prstGeom prst="ellipse">
@@ -4867,215 +4155,15 @@
             <a:pPr algn="ctr"/>
             <a:r>
               <a:rPr lang="de-DE" sz="1600" b="1"/>
-              <a:t>G</a:t>
+              <a:t>E</a:t>
             </a:r>
           </a:p>
         </p:txBody>
       </p:sp>
-      <p:cxnSp>
-        <p:nvCxnSpPr>
-          <p:cNvPr id="12" name="Gerader Verbinder 11">
-            <a:extLst>
-              <a:ext uri="{FF2B5EF4-FFF2-40B4-BE49-F238E27FC236}">
-                <a16:creationId xmlns:a16="http://schemas.microsoft.com/office/drawing/2014/main" id="{C9386D9D-4EF0-06AF-822A-7B5606AB1C5F}"/>
-              </a:ext>
-            </a:extLst>
-          </p:cNvPr>
-          <p:cNvCxnSpPr>
-            <a:cxnSpLocks/>
-          </p:cNvCxnSpPr>
-          <p:nvPr/>
-        </p:nvCxnSpPr>
-        <p:spPr>
-          <a:xfrm flipH="1">
-            <a:off x="2405307" y="1208459"/>
-            <a:ext cx="1038798" cy="0"/>
-          </a:xfrm>
-          <a:prstGeom prst="line">
-            <a:avLst/>
-          </a:prstGeom>
-          <a:ln>
-            <a:solidFill>
-              <a:schemeClr val="accent5">
-                <a:lumMod val="60000"/>
-                <a:lumOff val="40000"/>
-              </a:schemeClr>
-            </a:solidFill>
-            <a:headEnd type="arrow"/>
-            <a:tailEnd type="arrow"/>
-          </a:ln>
-        </p:spPr>
-        <p:style>
-          <a:lnRef idx="2">
-            <a:schemeClr val="accent1"/>
-          </a:lnRef>
-          <a:fillRef idx="0">
-            <a:schemeClr val="accent1"/>
-          </a:fillRef>
-          <a:effectRef idx="1">
-            <a:schemeClr val="accent1"/>
-          </a:effectRef>
-          <a:fontRef idx="minor">
-            <a:schemeClr val="tx1"/>
-          </a:fontRef>
-        </p:style>
-      </p:cxnSp>
-      <p:sp>
-        <p:nvSpPr>
-          <p:cNvPr id="13" name="Ellipse 12">
-            <a:extLst>
-              <a:ext uri="{FF2B5EF4-FFF2-40B4-BE49-F238E27FC236}">
-                <a16:creationId xmlns:a16="http://schemas.microsoft.com/office/drawing/2014/main" id="{C012AF5E-9F8F-56AE-C1F8-409A4FC6D6CA}"/>
-              </a:ext>
-            </a:extLst>
-          </p:cNvPr>
-          <p:cNvSpPr/>
-          <p:nvPr/>
-        </p:nvSpPr>
-        <p:spPr>
-          <a:xfrm>
-            <a:off x="2676264" y="957229"/>
-            <a:ext cx="289088" cy="289088"/>
-          </a:xfrm>
-          <a:prstGeom prst="ellipse">
-            <a:avLst/>
-          </a:prstGeom>
-          <a:solidFill>
-            <a:schemeClr val="accent5">
-              <a:lumMod val="60000"/>
-              <a:lumOff val="40000"/>
-            </a:schemeClr>
-          </a:solidFill>
-          <a:ln>
-            <a:noFill/>
-          </a:ln>
-        </p:spPr>
-        <p:style>
-          <a:lnRef idx="2">
-            <a:schemeClr val="accent1">
-              <a:shade val="15000"/>
-            </a:schemeClr>
-          </a:lnRef>
-          <a:fillRef idx="1">
-            <a:schemeClr val="accent1"/>
-          </a:fillRef>
-          <a:effectRef idx="0">
-            <a:schemeClr val="accent1"/>
-          </a:effectRef>
-          <a:fontRef idx="minor">
-            <a:schemeClr val="lt1"/>
-          </a:fontRef>
-        </p:style>
-        <p:txBody>
-          <a:bodyPr lIns="0" tIns="0" rIns="0" bIns="0" rtlCol="0" anchor="ctr"/>
-          <a:lstStyle/>
-          <a:p>
-            <a:pPr algn="ctr"/>
-            <a:r>
-              <a:rPr lang="de-DE" sz="1600" b="1"/>
-              <a:t>H</a:t>
-            </a:r>
-          </a:p>
-        </p:txBody>
-      </p:sp>
-      <p:cxnSp>
-        <p:nvCxnSpPr>
-          <p:cNvPr id="14" name="Gerader Verbinder 13">
-            <a:extLst>
-              <a:ext uri="{FF2B5EF4-FFF2-40B4-BE49-F238E27FC236}">
-                <a16:creationId xmlns:a16="http://schemas.microsoft.com/office/drawing/2014/main" id="{D462B3E8-B875-AD36-DC6D-DEB64DD6FF2C}"/>
-              </a:ext>
-            </a:extLst>
-          </p:cNvPr>
-          <p:cNvCxnSpPr>
-            <a:cxnSpLocks/>
-          </p:cNvCxnSpPr>
-          <p:nvPr/>
-        </p:nvCxnSpPr>
-        <p:spPr>
-          <a:xfrm>
-            <a:off x="3444105" y="1086009"/>
-            <a:ext cx="0" cy="6601768"/>
-          </a:xfrm>
-          <a:prstGeom prst="line">
-            <a:avLst/>
-          </a:prstGeom>
-          <a:ln>
-            <a:solidFill>
-              <a:schemeClr val="accent5">
-                <a:lumMod val="60000"/>
-                <a:lumOff val="40000"/>
-              </a:schemeClr>
-            </a:solidFill>
-            <a:prstDash val="dash"/>
-          </a:ln>
-        </p:spPr>
-        <p:style>
-          <a:lnRef idx="2">
-            <a:schemeClr val="accent1"/>
-          </a:lnRef>
-          <a:fillRef idx="0">
-            <a:schemeClr val="accent1"/>
-          </a:fillRef>
-          <a:effectRef idx="1">
-            <a:schemeClr val="accent1"/>
-          </a:effectRef>
-          <a:fontRef idx="minor">
-            <a:schemeClr val="tx1"/>
-          </a:fontRef>
-        </p:style>
-      </p:cxnSp>
-      <p:cxnSp>
-        <p:nvCxnSpPr>
-          <p:cNvPr id="16" name="Gerader Verbinder 15">
-            <a:extLst>
-              <a:ext uri="{FF2B5EF4-FFF2-40B4-BE49-F238E27FC236}">
-                <a16:creationId xmlns:a16="http://schemas.microsoft.com/office/drawing/2014/main" id="{87FEAB77-D9FE-36DB-0276-F439DE6F2498}"/>
-              </a:ext>
-            </a:extLst>
-          </p:cNvPr>
-          <p:cNvCxnSpPr>
-            <a:cxnSpLocks/>
-          </p:cNvCxnSpPr>
-          <p:nvPr/>
-        </p:nvCxnSpPr>
-        <p:spPr>
-          <a:xfrm>
-            <a:off x="8446162" y="733530"/>
-            <a:ext cx="0" cy="6954247"/>
-          </a:xfrm>
-          <a:prstGeom prst="line">
-            <a:avLst/>
-          </a:prstGeom>
-          <a:ln>
-            <a:solidFill>
-              <a:schemeClr val="accent5">
-                <a:lumMod val="60000"/>
-                <a:lumOff val="40000"/>
-              </a:schemeClr>
-            </a:solidFill>
-            <a:prstDash val="dash"/>
-          </a:ln>
-        </p:spPr>
-        <p:style>
-          <a:lnRef idx="2">
-            <a:schemeClr val="accent1"/>
-          </a:lnRef>
-          <a:fillRef idx="0">
-            <a:schemeClr val="accent1"/>
-          </a:fillRef>
-          <a:effectRef idx="1">
-            <a:schemeClr val="accent1"/>
-          </a:effectRef>
-          <a:fontRef idx="minor">
-            <a:schemeClr val="tx1"/>
-          </a:fontRef>
-        </p:style>
-      </p:cxnSp>
     </p:spTree>
     <p:extLst>
       <p:ext uri="{BB962C8B-B14F-4D97-AF65-F5344CB8AC3E}">
-        <p14:creationId xmlns:p14="http://schemas.microsoft.com/office/powerpoint/2010/main" val="1870587680"/>
+        <p14:creationId xmlns:p14="http://schemas.microsoft.com/office/powerpoint/2010/main" val="755774277"/>
       </p:ext>
     </p:extLst>
   </p:cSld>
@@ -7193,184 +6281,10 @@
           </a:fontRef>
         </p:style>
       </p:cxnSp>
-      <p:sp>
-        <p:nvSpPr>
-          <p:cNvPr id="15" name="Rechteck 14">
-            <a:extLst>
-              <a:ext uri="{FF2B5EF4-FFF2-40B4-BE49-F238E27FC236}">
-                <a16:creationId xmlns:a16="http://schemas.microsoft.com/office/drawing/2014/main" id="{88986488-C8C5-6AE9-2221-8CC50033911D}"/>
-              </a:ext>
-            </a:extLst>
-          </p:cNvPr>
-          <p:cNvSpPr/>
-          <p:nvPr/>
-        </p:nvSpPr>
-        <p:spPr>
-          <a:xfrm>
-            <a:off x="2415608" y="2273406"/>
-            <a:ext cx="8272730" cy="4493855"/>
-          </a:xfrm>
-          <a:prstGeom prst="rect">
-            <a:avLst/>
-          </a:prstGeom>
-          <a:solidFill>
-            <a:schemeClr val="accent1">
-              <a:alpha val="27000"/>
-            </a:schemeClr>
-          </a:solidFill>
-          <a:ln>
-            <a:solidFill>
-              <a:schemeClr val="accent1">
-                <a:shade val="15000"/>
-              </a:schemeClr>
-            </a:solidFill>
-          </a:ln>
-        </p:spPr>
-        <p:style>
-          <a:lnRef idx="2">
-            <a:schemeClr val="accent1">
-              <a:shade val="15000"/>
-            </a:schemeClr>
-          </a:lnRef>
-          <a:fillRef idx="1">
-            <a:schemeClr val="accent1"/>
-          </a:fillRef>
-          <a:effectRef idx="0">
-            <a:schemeClr val="accent1"/>
-          </a:effectRef>
-          <a:fontRef idx="minor">
-            <a:schemeClr val="lt1"/>
-          </a:fontRef>
-        </p:style>
-        <p:txBody>
-          <a:bodyPr rtlCol="0" anchor="ctr"/>
-          <a:lstStyle/>
-          <a:p>
-            <a:pPr algn="ctr"/>
-            <a:endParaRPr lang="de-DE"/>
-          </a:p>
-        </p:txBody>
-      </p:sp>
-      <p:sp>
-        <p:nvSpPr>
-          <p:cNvPr id="18" name="Rechteck 17">
-            <a:extLst>
-              <a:ext uri="{FF2B5EF4-FFF2-40B4-BE49-F238E27FC236}">
-                <a16:creationId xmlns:a16="http://schemas.microsoft.com/office/drawing/2014/main" id="{EEDFF620-00EE-48C0-FA35-9A1DC53FE124}"/>
-              </a:ext>
-            </a:extLst>
-          </p:cNvPr>
-          <p:cNvSpPr/>
-          <p:nvPr/>
-        </p:nvSpPr>
-        <p:spPr>
-          <a:xfrm>
-            <a:off x="2415608" y="5619250"/>
-            <a:ext cx="8282441" cy="1187054"/>
-          </a:xfrm>
-          <a:prstGeom prst="rect">
-            <a:avLst/>
-          </a:prstGeom>
-          <a:solidFill>
-            <a:schemeClr val="accent1">
-              <a:alpha val="27000"/>
-            </a:schemeClr>
-          </a:solidFill>
-          <a:ln>
-            <a:solidFill>
-              <a:schemeClr val="accent1">
-                <a:shade val="15000"/>
-              </a:schemeClr>
-            </a:solidFill>
-          </a:ln>
-        </p:spPr>
-        <p:style>
-          <a:lnRef idx="2">
-            <a:schemeClr val="accent1">
-              <a:shade val="15000"/>
-            </a:schemeClr>
-          </a:lnRef>
-          <a:fillRef idx="1">
-            <a:schemeClr val="accent1"/>
-          </a:fillRef>
-          <a:effectRef idx="0">
-            <a:schemeClr val="accent1"/>
-          </a:effectRef>
-          <a:fontRef idx="minor">
-            <a:schemeClr val="lt1"/>
-          </a:fontRef>
-        </p:style>
-        <p:txBody>
-          <a:bodyPr rtlCol="0" anchor="ctr"/>
-          <a:lstStyle/>
-          <a:p>
-            <a:pPr algn="ctr"/>
-            <a:endParaRPr lang="de-DE"/>
-          </a:p>
-        </p:txBody>
-      </p:sp>
-      <p:sp>
-        <p:nvSpPr>
-          <p:cNvPr id="19" name="Rechteck 18">
-            <a:extLst>
-              <a:ext uri="{FF2B5EF4-FFF2-40B4-BE49-F238E27FC236}">
-                <a16:creationId xmlns:a16="http://schemas.microsoft.com/office/drawing/2014/main" id="{28FD2FF6-DD04-8762-3E73-4EC2D5E0D411}"/>
-              </a:ext>
-            </a:extLst>
-          </p:cNvPr>
-          <p:cNvSpPr/>
-          <p:nvPr/>
-        </p:nvSpPr>
-        <p:spPr>
-          <a:xfrm>
-            <a:off x="3402033" y="2345374"/>
-            <a:ext cx="6268081" cy="3196832"/>
-          </a:xfrm>
-          <a:prstGeom prst="rect">
-            <a:avLst/>
-          </a:prstGeom>
-          <a:solidFill>
-            <a:schemeClr val="accent1">
-              <a:alpha val="27000"/>
-            </a:schemeClr>
-          </a:solidFill>
-          <a:ln>
-            <a:solidFill>
-              <a:schemeClr val="accent1">
-                <a:shade val="15000"/>
-              </a:schemeClr>
-            </a:solidFill>
-          </a:ln>
-        </p:spPr>
-        <p:style>
-          <a:lnRef idx="2">
-            <a:schemeClr val="accent1">
-              <a:shade val="15000"/>
-            </a:schemeClr>
-          </a:lnRef>
-          <a:fillRef idx="1">
-            <a:schemeClr val="accent1"/>
-          </a:fillRef>
-          <a:effectRef idx="0">
-            <a:schemeClr val="accent1"/>
-          </a:effectRef>
-          <a:fontRef idx="minor">
-            <a:schemeClr val="lt1"/>
-          </a:fontRef>
-        </p:style>
-        <p:txBody>
-          <a:bodyPr rtlCol="0" anchor="ctr"/>
-          <a:lstStyle/>
-          <a:p>
-            <a:pPr algn="ctr"/>
-            <a:endParaRPr lang="de-DE"/>
-          </a:p>
-        </p:txBody>
-      </p:sp>
     </p:spTree>
     <p:extLst>
       <p:ext uri="{BB962C8B-B14F-4D97-AF65-F5344CB8AC3E}">
-        <p14:creationId xmlns:p14="http://schemas.microsoft.com/office/powerpoint/2010/main" val="1764365589"/>
+        <p14:creationId xmlns:p14="http://schemas.microsoft.com/office/powerpoint/2010/main" val="1870587680"/>
       </p:ext>
     </p:extLst>
   </p:cSld>
@@ -9490,10 +8404,10 @@
       </p:cxnSp>
       <p:sp>
         <p:nvSpPr>
-          <p:cNvPr id="19" name="Rechteck 18">
-            <a:extLst>
-              <a:ext uri="{FF2B5EF4-FFF2-40B4-BE49-F238E27FC236}">
-                <a16:creationId xmlns:a16="http://schemas.microsoft.com/office/drawing/2014/main" id="{28FD2FF6-DD04-8762-3E73-4EC2D5E0D411}"/>
+          <p:cNvPr id="15" name="Rechteck 14">
+            <a:extLst>
+              <a:ext uri="{FF2B5EF4-FFF2-40B4-BE49-F238E27FC236}">
+                <a16:creationId xmlns:a16="http://schemas.microsoft.com/office/drawing/2014/main" id="{88986488-C8C5-6AE9-2221-8CC50033911D}"/>
               </a:ext>
             </a:extLst>
           </p:cNvPr>
@@ -9502,8 +8416,8 @@
         </p:nvSpPr>
         <p:spPr>
           <a:xfrm>
-            <a:off x="2413582" y="1664672"/>
-            <a:ext cx="8282441" cy="3820167"/>
+            <a:off x="2415608" y="2273406"/>
+            <a:ext cx="8272730" cy="4493855"/>
           </a:xfrm>
           <a:prstGeom prst="rect">
             <a:avLst/>
@@ -9548,10 +8462,10 @@
       </p:sp>
       <p:sp>
         <p:nvSpPr>
-          <p:cNvPr id="17" name="Rechteck 16">
-            <a:extLst>
-              <a:ext uri="{FF2B5EF4-FFF2-40B4-BE49-F238E27FC236}">
-                <a16:creationId xmlns:a16="http://schemas.microsoft.com/office/drawing/2014/main" id="{42B6FA6B-D07A-C45C-A186-73A2B9B32FD0}"/>
+          <p:cNvPr id="18" name="Rechteck 17">
+            <a:extLst>
+              <a:ext uri="{FF2B5EF4-FFF2-40B4-BE49-F238E27FC236}">
+                <a16:creationId xmlns:a16="http://schemas.microsoft.com/office/drawing/2014/main" id="{EEDFF620-00EE-48C0-FA35-9A1DC53FE124}"/>
               </a:ext>
             </a:extLst>
           </p:cNvPr>
@@ -9606,10 +8520,10 @@
       </p:sp>
       <p:sp>
         <p:nvSpPr>
-          <p:cNvPr id="21" name="Rechteck 20">
-            <a:extLst>
-              <a:ext uri="{FF2B5EF4-FFF2-40B4-BE49-F238E27FC236}">
-                <a16:creationId xmlns:a16="http://schemas.microsoft.com/office/drawing/2014/main" id="{9027454B-36B6-B1DB-66F3-520254A6AC76}"/>
+          <p:cNvPr id="19" name="Rechteck 18">
+            <a:extLst>
+              <a:ext uri="{FF2B5EF4-FFF2-40B4-BE49-F238E27FC236}">
+                <a16:creationId xmlns:a16="http://schemas.microsoft.com/office/drawing/2014/main" id="{28FD2FF6-DD04-8762-3E73-4EC2D5E0D411}"/>
               </a:ext>
             </a:extLst>
           </p:cNvPr>
@@ -9618,8 +8532,8 @@
         </p:nvSpPr>
         <p:spPr>
           <a:xfrm>
-            <a:off x="3354889" y="2498661"/>
-            <a:ext cx="6268081" cy="2605562"/>
+            <a:off x="3402033" y="2345374"/>
+            <a:ext cx="6268081" cy="3196832"/>
           </a:xfrm>
           <a:prstGeom prst="rect">
             <a:avLst/>
@@ -9665,7 +8579,7 @@
     </p:spTree>
     <p:extLst>
       <p:ext uri="{BB962C8B-B14F-4D97-AF65-F5344CB8AC3E}">
-        <p14:creationId xmlns:p14="http://schemas.microsoft.com/office/powerpoint/2010/main" val="3931755414"/>
+        <p14:creationId xmlns:p14="http://schemas.microsoft.com/office/powerpoint/2010/main" val="1764365589"/>
       </p:ext>
     </p:extLst>
   </p:cSld>
@@ -11785,10 +10699,10 @@
       </p:cxnSp>
       <p:sp>
         <p:nvSpPr>
-          <p:cNvPr id="15" name="Rechteck 14">
-            <a:extLst>
-              <a:ext uri="{FF2B5EF4-FFF2-40B4-BE49-F238E27FC236}">
-                <a16:creationId xmlns:a16="http://schemas.microsoft.com/office/drawing/2014/main" id="{88986488-C8C5-6AE9-2221-8CC50033911D}"/>
+          <p:cNvPr id="19" name="Rechteck 18">
+            <a:extLst>
+              <a:ext uri="{FF2B5EF4-FFF2-40B4-BE49-F238E27FC236}">
+                <a16:creationId xmlns:a16="http://schemas.microsoft.com/office/drawing/2014/main" id="{28FD2FF6-DD04-8762-3E73-4EC2D5E0D411}"/>
               </a:ext>
             </a:extLst>
           </p:cNvPr>
@@ -11797,8 +10711,124 @@
         </p:nvSpPr>
         <p:spPr>
           <a:xfrm>
-            <a:off x="2415608" y="2271460"/>
-            <a:ext cx="8272730" cy="4497745"/>
+            <a:off x="2413582" y="1664672"/>
+            <a:ext cx="8282441" cy="3820167"/>
+          </a:xfrm>
+          <a:prstGeom prst="rect">
+            <a:avLst/>
+          </a:prstGeom>
+          <a:solidFill>
+            <a:schemeClr val="accent1">
+              <a:alpha val="27000"/>
+            </a:schemeClr>
+          </a:solidFill>
+          <a:ln>
+            <a:solidFill>
+              <a:schemeClr val="accent1">
+                <a:shade val="15000"/>
+              </a:schemeClr>
+            </a:solidFill>
+          </a:ln>
+        </p:spPr>
+        <p:style>
+          <a:lnRef idx="2">
+            <a:schemeClr val="accent1">
+              <a:shade val="15000"/>
+            </a:schemeClr>
+          </a:lnRef>
+          <a:fillRef idx="1">
+            <a:schemeClr val="accent1"/>
+          </a:fillRef>
+          <a:effectRef idx="0">
+            <a:schemeClr val="accent1"/>
+          </a:effectRef>
+          <a:fontRef idx="minor">
+            <a:schemeClr val="lt1"/>
+          </a:fontRef>
+        </p:style>
+        <p:txBody>
+          <a:bodyPr rtlCol="0" anchor="ctr"/>
+          <a:lstStyle/>
+          <a:p>
+            <a:pPr algn="ctr"/>
+            <a:endParaRPr lang="de-DE"/>
+          </a:p>
+        </p:txBody>
+      </p:sp>
+      <p:sp>
+        <p:nvSpPr>
+          <p:cNvPr id="17" name="Rechteck 16">
+            <a:extLst>
+              <a:ext uri="{FF2B5EF4-FFF2-40B4-BE49-F238E27FC236}">
+                <a16:creationId xmlns:a16="http://schemas.microsoft.com/office/drawing/2014/main" id="{42B6FA6B-D07A-C45C-A186-73A2B9B32FD0}"/>
+              </a:ext>
+            </a:extLst>
+          </p:cNvPr>
+          <p:cNvSpPr/>
+          <p:nvPr/>
+        </p:nvSpPr>
+        <p:spPr>
+          <a:xfrm>
+            <a:off x="2415608" y="5619250"/>
+            <a:ext cx="8282441" cy="1187054"/>
+          </a:xfrm>
+          <a:prstGeom prst="rect">
+            <a:avLst/>
+          </a:prstGeom>
+          <a:solidFill>
+            <a:schemeClr val="accent1">
+              <a:alpha val="27000"/>
+            </a:schemeClr>
+          </a:solidFill>
+          <a:ln>
+            <a:solidFill>
+              <a:schemeClr val="accent1">
+                <a:shade val="15000"/>
+              </a:schemeClr>
+            </a:solidFill>
+          </a:ln>
+        </p:spPr>
+        <p:style>
+          <a:lnRef idx="2">
+            <a:schemeClr val="accent1">
+              <a:shade val="15000"/>
+            </a:schemeClr>
+          </a:lnRef>
+          <a:fillRef idx="1">
+            <a:schemeClr val="accent1"/>
+          </a:fillRef>
+          <a:effectRef idx="0">
+            <a:schemeClr val="accent1"/>
+          </a:effectRef>
+          <a:fontRef idx="minor">
+            <a:schemeClr val="lt1"/>
+          </a:fontRef>
+        </p:style>
+        <p:txBody>
+          <a:bodyPr rtlCol="0" anchor="ctr"/>
+          <a:lstStyle/>
+          <a:p>
+            <a:pPr algn="ctr"/>
+            <a:endParaRPr lang="de-DE"/>
+          </a:p>
+        </p:txBody>
+      </p:sp>
+      <p:sp>
+        <p:nvSpPr>
+          <p:cNvPr id="21" name="Rechteck 20">
+            <a:extLst>
+              <a:ext uri="{FF2B5EF4-FFF2-40B4-BE49-F238E27FC236}">
+                <a16:creationId xmlns:a16="http://schemas.microsoft.com/office/drawing/2014/main" id="{9027454B-36B6-B1DB-66F3-520254A6AC76}"/>
+              </a:ext>
+            </a:extLst>
+          </p:cNvPr>
+          <p:cNvSpPr/>
+          <p:nvPr/>
+        </p:nvSpPr>
+        <p:spPr>
+          <a:xfrm>
+            <a:off x="3354889" y="2498661"/>
+            <a:ext cx="6268081" cy="2605562"/>
           </a:xfrm>
           <a:prstGeom prst="rect">
             <a:avLst/>
@@ -11844,7 +10874,7 @@
     </p:spTree>
     <p:extLst>
       <p:ext uri="{BB962C8B-B14F-4D97-AF65-F5344CB8AC3E}">
-        <p14:creationId xmlns:p14="http://schemas.microsoft.com/office/powerpoint/2010/main" val="755774277"/>
+        <p14:creationId xmlns:p14="http://schemas.microsoft.com/office/powerpoint/2010/main" val="3931755414"/>
       </p:ext>
     </p:extLst>
   </p:cSld>

</xml_diff>